<commit_message>
Modificação no PowerPoint (ferramenta)
</commit_message>
<xml_diff>
--- a/Documentação/slide-synergy (2).pptx
+++ b/Documentação/slide-synergy (2).pptx
@@ -280,7 +280,7 @@
           <a:p>
             <a:fld id="{655F7DB7-5B35-44EF-86DD-30F04B6260EF}" type="datetimeFigureOut">
               <a:rPr lang="pt-BR" smtClean="0"/>
-              <a:t>29/04/2020</a:t>
+              <a:t>01/05/2020</a:t>
             </a:fld>
             <a:endParaRPr lang="pt-BR"/>
           </a:p>
@@ -694,7 +694,7 @@
           <a:p>
             <a:fld id="{15B003F1-72A3-4565-B369-F67C067E940D}" type="datetimeFigureOut">
               <a:rPr lang="pt-BR" smtClean="0"/>
-              <a:t>29/04/2020</a:t>
+              <a:t>01/05/2020</a:t>
             </a:fld>
             <a:endParaRPr lang="pt-BR"/>
           </a:p>
@@ -895,7 +895,7 @@
           <a:p>
             <a:fld id="{15B003F1-72A3-4565-B369-F67C067E940D}" type="datetimeFigureOut">
               <a:rPr lang="pt-BR" smtClean="0"/>
-              <a:t>29/04/2020</a:t>
+              <a:t>01/05/2020</a:t>
             </a:fld>
             <a:endParaRPr lang="pt-BR"/>
           </a:p>
@@ -1106,7 +1106,7 @@
           <a:p>
             <a:fld id="{15B003F1-72A3-4565-B369-F67C067E940D}" type="datetimeFigureOut">
               <a:rPr lang="pt-BR" smtClean="0"/>
-              <a:t>29/04/2020</a:t>
+              <a:t>01/05/2020</a:t>
             </a:fld>
             <a:endParaRPr lang="pt-BR"/>
           </a:p>
@@ -1307,7 +1307,7 @@
           <a:p>
             <a:fld id="{15B003F1-72A3-4565-B369-F67C067E940D}" type="datetimeFigureOut">
               <a:rPr lang="pt-BR" smtClean="0"/>
-              <a:t>29/04/2020</a:t>
+              <a:t>01/05/2020</a:t>
             </a:fld>
             <a:endParaRPr lang="pt-BR"/>
           </a:p>
@@ -1585,7 +1585,7 @@
           <a:p>
             <a:fld id="{15B003F1-72A3-4565-B369-F67C067E940D}" type="datetimeFigureOut">
               <a:rPr lang="pt-BR" smtClean="0"/>
-              <a:t>29/04/2020</a:t>
+              <a:t>01/05/2020</a:t>
             </a:fld>
             <a:endParaRPr lang="pt-BR"/>
           </a:p>
@@ -1853,7 +1853,7 @@
           <a:p>
             <a:fld id="{15B003F1-72A3-4565-B369-F67C067E940D}" type="datetimeFigureOut">
               <a:rPr lang="pt-BR" smtClean="0"/>
-              <a:t>29/04/2020</a:t>
+              <a:t>01/05/2020</a:t>
             </a:fld>
             <a:endParaRPr lang="pt-BR"/>
           </a:p>
@@ -2268,7 +2268,7 @@
           <a:p>
             <a:fld id="{15B003F1-72A3-4565-B369-F67C067E940D}" type="datetimeFigureOut">
               <a:rPr lang="pt-BR" smtClean="0"/>
-              <a:t>29/04/2020</a:t>
+              <a:t>01/05/2020</a:t>
             </a:fld>
             <a:endParaRPr lang="pt-BR"/>
           </a:p>
@@ -2412,7 +2412,7 @@
           <a:p>
             <a:fld id="{15B003F1-72A3-4565-B369-F67C067E940D}" type="datetimeFigureOut">
               <a:rPr lang="pt-BR" smtClean="0"/>
-              <a:t>29/04/2020</a:t>
+              <a:t>01/05/2020</a:t>
             </a:fld>
             <a:endParaRPr lang="pt-BR"/>
           </a:p>
@@ -2528,7 +2528,7 @@
           <a:p>
             <a:fld id="{15B003F1-72A3-4565-B369-F67C067E940D}" type="datetimeFigureOut">
               <a:rPr lang="pt-BR" smtClean="0"/>
-              <a:t>29/04/2020</a:t>
+              <a:t>01/05/2020</a:t>
             </a:fld>
             <a:endParaRPr lang="pt-BR"/>
           </a:p>
@@ -2842,7 +2842,7 @@
           <a:p>
             <a:fld id="{15B003F1-72A3-4565-B369-F67C067E940D}" type="datetimeFigureOut">
               <a:rPr lang="pt-BR" smtClean="0"/>
-              <a:t>29/04/2020</a:t>
+              <a:t>01/05/2020</a:t>
             </a:fld>
             <a:endParaRPr lang="pt-BR"/>
           </a:p>
@@ -3133,7 +3133,7 @@
           <a:p>
             <a:fld id="{15B003F1-72A3-4565-B369-F67C067E940D}" type="datetimeFigureOut">
               <a:rPr lang="pt-BR" smtClean="0"/>
-              <a:t>29/04/2020</a:t>
+              <a:t>01/05/2020</a:t>
             </a:fld>
             <a:endParaRPr lang="pt-BR"/>
           </a:p>
@@ -3377,7 +3377,7 @@
           <a:p>
             <a:fld id="{15B003F1-72A3-4565-B369-F67C067E940D}" type="datetimeFigureOut">
               <a:rPr lang="pt-BR" smtClean="0"/>
-              <a:t>29/04/2020</a:t>
+              <a:t>01/05/2020</a:t>
             </a:fld>
             <a:endParaRPr lang="pt-BR"/>
           </a:p>
@@ -9299,6 +9299,36 @@
       </p:grpSpPr>
       <p:pic>
         <p:nvPicPr>
+          <p:cNvPr id="3" name="Imagem 2"/>
+          <p:cNvPicPr>
+            <a:picLocks noChangeAspect="1"/>
+          </p:cNvPicPr>
+          <p:nvPr/>
+        </p:nvPicPr>
+        <p:blipFill>
+          <a:blip r:embed="rId2">
+            <a:extLst>
+              <a:ext uri="{28A0092B-C50C-407E-A947-70E740481C1C}">
+                <a14:useLocalDpi xmlns:a14="http://schemas.microsoft.com/office/drawing/2010/main" val="0"/>
+              </a:ext>
+            </a:extLst>
+          </a:blip>
+          <a:stretch>
+            <a:fillRect/>
+          </a:stretch>
+        </p:blipFill>
+        <p:spPr>
+          <a:xfrm>
+            <a:off x="361730" y="2642820"/>
+            <a:ext cx="2800741" cy="3400900"/>
+          </a:xfrm>
+          <a:prstGeom prst="rect">
+            <a:avLst/>
+          </a:prstGeom>
+        </p:spPr>
+      </p:pic>
+      <p:pic>
+        <p:nvPicPr>
           <p:cNvPr id="14" name="Imagem 13"/>
           <p:cNvPicPr>
             <a:picLocks noChangeAspect="1"/>
@@ -9306,7 +9336,7 @@
           <p:nvPr/>
         </p:nvPicPr>
         <p:blipFill>
-          <a:blip r:embed="rId2">
+          <a:blip r:embed="rId3">
             <a:extLst>
               <a:ext uri="{28A0092B-C50C-407E-A947-70E740481C1C}">
                 <a14:useLocalDpi xmlns:a14="http://schemas.microsoft.com/office/drawing/2010/main" val="0"/>
@@ -9338,7 +9368,7 @@
           </p:nvPr>
         </p:nvPicPr>
         <p:blipFill>
-          <a:blip r:embed="rId3">
+          <a:blip r:embed="rId4">
             <a:extLst>
               <a:ext uri="{28A0092B-C50C-407E-A947-70E740481C1C}">
                 <a14:useLocalDpi xmlns:a14="http://schemas.microsoft.com/office/drawing/2010/main" val="0"/>
@@ -9421,36 +9451,6 @@
           </a:p>
         </p:txBody>
       </p:sp>
-      <p:pic>
-        <p:nvPicPr>
-          <p:cNvPr id="11" name="Imagem 10"/>
-          <p:cNvPicPr>
-            <a:picLocks noChangeAspect="1"/>
-          </p:cNvPicPr>
-          <p:nvPr/>
-        </p:nvPicPr>
-        <p:blipFill>
-          <a:blip r:embed="rId4">
-            <a:extLst>
-              <a:ext uri="{28A0092B-C50C-407E-A947-70E740481C1C}">
-                <a14:useLocalDpi xmlns:a14="http://schemas.microsoft.com/office/drawing/2010/main" val="0"/>
-              </a:ext>
-            </a:extLst>
-          </a:blip>
-          <a:stretch>
-            <a:fillRect/>
-          </a:stretch>
-        </p:blipFill>
-        <p:spPr>
-          <a:xfrm>
-            <a:off x="442705" y="2642820"/>
-            <a:ext cx="2638793" cy="3400900"/>
-          </a:xfrm>
-          <a:prstGeom prst="rect">
-            <a:avLst/>
-          </a:prstGeom>
-        </p:spPr>
-      </p:pic>
       <p:sp>
         <p:nvSpPr>
           <p:cNvPr id="13" name="CaixaDeTexto 12"/>
@@ -9747,7 +9747,7 @@
                 <a16:creationId xmlns:a16="http://schemas.microsoft.com/office/drawing/2014/main" id="{2B1D4F77-A17C-43D7-B7FA-545148E4E93D}"/>
               </a:ext>
               <a:ext uri="{C183D7F6-B498-43B3-948B-1728B52AA6E4}">
-                <adec:decorative xmlns:adec="http://schemas.microsoft.com/office/drawing/2017/decorative" xmlns="" val="1"/>
+                <adec:decorative xmlns="" xmlns:adec="http://schemas.microsoft.com/office/drawing/2017/decorative" val="1"/>
               </a:ext>
             </a:extLst>
           </p:cNvPr>
@@ -13431,7 +13431,7 @@
                 <a16:creationId xmlns:a16="http://schemas.microsoft.com/office/drawing/2014/main" id="{B4D3D850-2041-4B7C-AED9-54DA385B14F7}"/>
               </a:ext>
               <a:ext uri="{C183D7F6-B498-43B3-948B-1728B52AA6E4}">
-                <adec:decorative xmlns:adec="http://schemas.microsoft.com/office/drawing/2017/decorative" xmlns="" val="1"/>
+                <adec:decorative xmlns="" xmlns:adec="http://schemas.microsoft.com/office/drawing/2017/decorative" val="1"/>
               </a:ext>
             </a:extLst>
           </p:cNvPr>
@@ -13564,7 +13564,7 @@
                 <a16:creationId xmlns:a16="http://schemas.microsoft.com/office/drawing/2014/main" id="{B497CCB5-5FC2-473C-AFCC-2430CEF1DF71}"/>
               </a:ext>
               <a:ext uri="{C183D7F6-B498-43B3-948B-1728B52AA6E4}">
-                <adec:decorative xmlns:adec="http://schemas.microsoft.com/office/drawing/2017/decorative" xmlns="" val="1"/>
+                <adec:decorative xmlns="" xmlns:adec="http://schemas.microsoft.com/office/drawing/2017/decorative" val="1"/>
               </a:ext>
             </a:extLst>
           </p:cNvPr>
@@ -13627,7 +13627,7 @@
                 <a16:creationId xmlns:a16="http://schemas.microsoft.com/office/drawing/2014/main" id="{599C8C75-BFDF-44E7-A028-EEB5EDD58817}"/>
               </a:ext>
               <a:ext uri="{C183D7F6-B498-43B3-948B-1728B52AA6E4}">
-                <adec:decorative xmlns:adec="http://schemas.microsoft.com/office/drawing/2017/decorative" xmlns="" val="1"/>
+                <adec:decorative xmlns="" xmlns:adec="http://schemas.microsoft.com/office/drawing/2017/decorative" val="1"/>
               </a:ext>
             </a:extLst>
           </p:cNvPr>

</xml_diff>

<commit_message>
alteracoes site e dash
</commit_message>
<xml_diff>
--- a/Documentação/slide-synergy (2).pptx
+++ b/Documentação/slide-synergy (2).pptx
@@ -280,7 +280,7 @@
           <a:p>
             <a:fld id="{655F7DB7-5B35-44EF-86DD-30F04B6260EF}" type="datetimeFigureOut">
               <a:rPr lang="pt-BR" smtClean="0"/>
-              <a:t>01/05/2020</a:t>
+              <a:t>03/05/2020</a:t>
             </a:fld>
             <a:endParaRPr lang="pt-BR"/>
           </a:p>
@@ -694,7 +694,7 @@
           <a:p>
             <a:fld id="{15B003F1-72A3-4565-B369-F67C067E940D}" type="datetimeFigureOut">
               <a:rPr lang="pt-BR" smtClean="0"/>
-              <a:t>01/05/2020</a:t>
+              <a:t>03/05/2020</a:t>
             </a:fld>
             <a:endParaRPr lang="pt-BR"/>
           </a:p>
@@ -895,7 +895,7 @@
           <a:p>
             <a:fld id="{15B003F1-72A3-4565-B369-F67C067E940D}" type="datetimeFigureOut">
               <a:rPr lang="pt-BR" smtClean="0"/>
-              <a:t>01/05/2020</a:t>
+              <a:t>03/05/2020</a:t>
             </a:fld>
             <a:endParaRPr lang="pt-BR"/>
           </a:p>
@@ -1106,7 +1106,7 @@
           <a:p>
             <a:fld id="{15B003F1-72A3-4565-B369-F67C067E940D}" type="datetimeFigureOut">
               <a:rPr lang="pt-BR" smtClean="0"/>
-              <a:t>01/05/2020</a:t>
+              <a:t>03/05/2020</a:t>
             </a:fld>
             <a:endParaRPr lang="pt-BR"/>
           </a:p>
@@ -1307,7 +1307,7 @@
           <a:p>
             <a:fld id="{15B003F1-72A3-4565-B369-F67C067E940D}" type="datetimeFigureOut">
               <a:rPr lang="pt-BR" smtClean="0"/>
-              <a:t>01/05/2020</a:t>
+              <a:t>03/05/2020</a:t>
             </a:fld>
             <a:endParaRPr lang="pt-BR"/>
           </a:p>
@@ -1585,7 +1585,7 @@
           <a:p>
             <a:fld id="{15B003F1-72A3-4565-B369-F67C067E940D}" type="datetimeFigureOut">
               <a:rPr lang="pt-BR" smtClean="0"/>
-              <a:t>01/05/2020</a:t>
+              <a:t>03/05/2020</a:t>
             </a:fld>
             <a:endParaRPr lang="pt-BR"/>
           </a:p>
@@ -1853,7 +1853,7 @@
           <a:p>
             <a:fld id="{15B003F1-72A3-4565-B369-F67C067E940D}" type="datetimeFigureOut">
               <a:rPr lang="pt-BR" smtClean="0"/>
-              <a:t>01/05/2020</a:t>
+              <a:t>03/05/2020</a:t>
             </a:fld>
             <a:endParaRPr lang="pt-BR"/>
           </a:p>
@@ -2268,7 +2268,7 @@
           <a:p>
             <a:fld id="{15B003F1-72A3-4565-B369-F67C067E940D}" type="datetimeFigureOut">
               <a:rPr lang="pt-BR" smtClean="0"/>
-              <a:t>01/05/2020</a:t>
+              <a:t>03/05/2020</a:t>
             </a:fld>
             <a:endParaRPr lang="pt-BR"/>
           </a:p>
@@ -2412,7 +2412,7 @@
           <a:p>
             <a:fld id="{15B003F1-72A3-4565-B369-F67C067E940D}" type="datetimeFigureOut">
               <a:rPr lang="pt-BR" smtClean="0"/>
-              <a:t>01/05/2020</a:t>
+              <a:t>03/05/2020</a:t>
             </a:fld>
             <a:endParaRPr lang="pt-BR"/>
           </a:p>
@@ -2528,7 +2528,7 @@
           <a:p>
             <a:fld id="{15B003F1-72A3-4565-B369-F67C067E940D}" type="datetimeFigureOut">
               <a:rPr lang="pt-BR" smtClean="0"/>
-              <a:t>01/05/2020</a:t>
+              <a:t>03/05/2020</a:t>
             </a:fld>
             <a:endParaRPr lang="pt-BR"/>
           </a:p>
@@ -2842,7 +2842,7 @@
           <a:p>
             <a:fld id="{15B003F1-72A3-4565-B369-F67C067E940D}" type="datetimeFigureOut">
               <a:rPr lang="pt-BR" smtClean="0"/>
-              <a:t>01/05/2020</a:t>
+              <a:t>03/05/2020</a:t>
             </a:fld>
             <a:endParaRPr lang="pt-BR"/>
           </a:p>
@@ -3133,7 +3133,7 @@
           <a:p>
             <a:fld id="{15B003F1-72A3-4565-B369-F67C067E940D}" type="datetimeFigureOut">
               <a:rPr lang="pt-BR" smtClean="0"/>
-              <a:t>01/05/2020</a:t>
+              <a:t>03/05/2020</a:t>
             </a:fld>
             <a:endParaRPr lang="pt-BR"/>
           </a:p>
@@ -3377,7 +3377,7 @@
           <a:p>
             <a:fld id="{15B003F1-72A3-4565-B369-F67C067E940D}" type="datetimeFigureOut">
               <a:rPr lang="pt-BR" smtClean="0"/>
-              <a:t>01/05/2020</a:t>
+              <a:t>03/05/2020</a:t>
             </a:fld>
             <a:endParaRPr lang="pt-BR"/>
           </a:p>
@@ -4154,8 +4154,8 @@
         </p:blipFill>
         <p:spPr>
           <a:xfrm>
-            <a:off x="2278965" y="3082926"/>
-            <a:ext cx="7624691" cy="2985285"/>
+            <a:off x="2278965" y="2965270"/>
+            <a:ext cx="7624691" cy="3102942"/>
           </a:xfrm>
           <a:prstGeom prst="rect">
             <a:avLst/>
@@ -9747,7 +9747,7 @@
                 <a16:creationId xmlns:a16="http://schemas.microsoft.com/office/drawing/2014/main" id="{2B1D4F77-A17C-43D7-B7FA-545148E4E93D}"/>
               </a:ext>
               <a:ext uri="{C183D7F6-B498-43B3-948B-1728B52AA6E4}">
-                <adec:decorative xmlns="" xmlns:adec="http://schemas.microsoft.com/office/drawing/2017/decorative" val="1"/>
+                <adec:decorative xmlns:adec="http://schemas.microsoft.com/office/drawing/2017/decorative" xmlns="" val="1"/>
               </a:ext>
             </a:extLst>
           </p:cNvPr>
@@ -11219,8 +11219,8 @@
         </p:blipFill>
         <p:spPr>
           <a:xfrm>
-            <a:off x="4240090" y="2894181"/>
-            <a:ext cx="1569600" cy="1541209"/>
+            <a:off x="4240090" y="2855953"/>
+            <a:ext cx="1569600" cy="1579438"/>
           </a:xfrm>
           <a:prstGeom prst="ellipse">
             <a:avLst/>
@@ -13431,7 +13431,7 @@
                 <a16:creationId xmlns:a16="http://schemas.microsoft.com/office/drawing/2014/main" id="{B4D3D850-2041-4B7C-AED9-54DA385B14F7}"/>
               </a:ext>
               <a:ext uri="{C183D7F6-B498-43B3-948B-1728B52AA6E4}">
-                <adec:decorative xmlns="" xmlns:adec="http://schemas.microsoft.com/office/drawing/2017/decorative" val="1"/>
+                <adec:decorative xmlns:adec="http://schemas.microsoft.com/office/drawing/2017/decorative" xmlns="" val="1"/>
               </a:ext>
             </a:extLst>
           </p:cNvPr>
@@ -13564,7 +13564,7 @@
                 <a16:creationId xmlns:a16="http://schemas.microsoft.com/office/drawing/2014/main" id="{B497CCB5-5FC2-473C-AFCC-2430CEF1DF71}"/>
               </a:ext>
               <a:ext uri="{C183D7F6-B498-43B3-948B-1728B52AA6E4}">
-                <adec:decorative xmlns="" xmlns:adec="http://schemas.microsoft.com/office/drawing/2017/decorative" val="1"/>
+                <adec:decorative xmlns:adec="http://schemas.microsoft.com/office/drawing/2017/decorative" xmlns="" val="1"/>
               </a:ext>
             </a:extLst>
           </p:cNvPr>
@@ -13627,7 +13627,7 @@
                 <a16:creationId xmlns:a16="http://schemas.microsoft.com/office/drawing/2014/main" id="{599C8C75-BFDF-44E7-A028-EEB5EDD58817}"/>
               </a:ext>
               <a:ext uri="{C183D7F6-B498-43B3-948B-1728B52AA6E4}">
-                <adec:decorative xmlns="" xmlns:adec="http://schemas.microsoft.com/office/drawing/2017/decorative" val="1"/>
+                <adec:decorative xmlns:adec="http://schemas.microsoft.com/office/drawing/2017/decorative" xmlns="" val="1"/>
               </a:ext>
             </a:extLst>
           </p:cNvPr>

</xml_diff>

<commit_message>
mudança no slide de apresentação
</commit_message>
<xml_diff>
--- a/Documentação/slide-synergy (2).pptx
+++ b/Documentação/slide-synergy (2).pptx
@@ -5,7 +5,7 @@
     <p:sldMasterId id="2147483648" r:id="rId1"/>
   </p:sldMasterIdLst>
   <p:notesMasterIdLst>
-    <p:notesMasterId r:id="rId22"/>
+    <p:notesMasterId r:id="rId24"/>
   </p:notesMasterIdLst>
   <p:sldIdLst>
     <p:sldId id="256" r:id="rId2"/>
@@ -26,8 +26,10 @@
     <p:sldId id="278" r:id="rId17"/>
     <p:sldId id="279" r:id="rId18"/>
     <p:sldId id="262" r:id="rId19"/>
-    <p:sldId id="271" r:id="rId20"/>
-    <p:sldId id="272" r:id="rId21"/>
+    <p:sldId id="283" r:id="rId20"/>
+    <p:sldId id="271" r:id="rId21"/>
+    <p:sldId id="272" r:id="rId22"/>
+    <p:sldId id="282" r:id="rId23"/>
   </p:sldIdLst>
   <p:sldSz cx="12192000" cy="6858000"/>
   <p:notesSz cx="6858000" cy="9144000"/>
@@ -224,7 +226,7 @@
           <a:p>
             <a:fld id="{655F7DB7-5B35-44EF-86DD-30F04B6260EF}" type="datetimeFigureOut">
               <a:rPr lang="pt-BR" smtClean="0"/>
-              <a:t>05/05/2020</a:t>
+              <a:t>06/05/2020</a:t>
             </a:fld>
             <a:endParaRPr lang="pt-BR"/>
           </a:p>
@@ -638,7 +640,7 @@
           <a:p>
             <a:fld id="{15B003F1-72A3-4565-B369-F67C067E940D}" type="datetimeFigureOut">
               <a:rPr lang="pt-BR" smtClean="0"/>
-              <a:t>05/05/2020</a:t>
+              <a:t>06/05/2020</a:t>
             </a:fld>
             <a:endParaRPr lang="pt-BR"/>
           </a:p>
@@ -839,7 +841,7 @@
           <a:p>
             <a:fld id="{15B003F1-72A3-4565-B369-F67C067E940D}" type="datetimeFigureOut">
               <a:rPr lang="pt-BR" smtClean="0"/>
-              <a:t>05/05/2020</a:t>
+              <a:t>06/05/2020</a:t>
             </a:fld>
             <a:endParaRPr lang="pt-BR"/>
           </a:p>
@@ -1050,7 +1052,7 @@
           <a:p>
             <a:fld id="{15B003F1-72A3-4565-B369-F67C067E940D}" type="datetimeFigureOut">
               <a:rPr lang="pt-BR" smtClean="0"/>
-              <a:t>05/05/2020</a:t>
+              <a:t>06/05/2020</a:t>
             </a:fld>
             <a:endParaRPr lang="pt-BR"/>
           </a:p>
@@ -1251,7 +1253,7 @@
           <a:p>
             <a:fld id="{15B003F1-72A3-4565-B369-F67C067E940D}" type="datetimeFigureOut">
               <a:rPr lang="pt-BR" smtClean="0"/>
-              <a:t>05/05/2020</a:t>
+              <a:t>06/05/2020</a:t>
             </a:fld>
             <a:endParaRPr lang="pt-BR"/>
           </a:p>
@@ -1529,7 +1531,7 @@
           <a:p>
             <a:fld id="{15B003F1-72A3-4565-B369-F67C067E940D}" type="datetimeFigureOut">
               <a:rPr lang="pt-BR" smtClean="0"/>
-              <a:t>05/05/2020</a:t>
+              <a:t>06/05/2020</a:t>
             </a:fld>
             <a:endParaRPr lang="pt-BR"/>
           </a:p>
@@ -1797,7 +1799,7 @@
           <a:p>
             <a:fld id="{15B003F1-72A3-4565-B369-F67C067E940D}" type="datetimeFigureOut">
               <a:rPr lang="pt-BR" smtClean="0"/>
-              <a:t>05/05/2020</a:t>
+              <a:t>06/05/2020</a:t>
             </a:fld>
             <a:endParaRPr lang="pt-BR"/>
           </a:p>
@@ -2212,7 +2214,7 @@
           <a:p>
             <a:fld id="{15B003F1-72A3-4565-B369-F67C067E940D}" type="datetimeFigureOut">
               <a:rPr lang="pt-BR" smtClean="0"/>
-              <a:t>05/05/2020</a:t>
+              <a:t>06/05/2020</a:t>
             </a:fld>
             <a:endParaRPr lang="pt-BR"/>
           </a:p>
@@ -2356,7 +2358,7 @@
           <a:p>
             <a:fld id="{15B003F1-72A3-4565-B369-F67C067E940D}" type="datetimeFigureOut">
               <a:rPr lang="pt-BR" smtClean="0"/>
-              <a:t>05/05/2020</a:t>
+              <a:t>06/05/2020</a:t>
             </a:fld>
             <a:endParaRPr lang="pt-BR"/>
           </a:p>
@@ -2472,7 +2474,7 @@
           <a:p>
             <a:fld id="{15B003F1-72A3-4565-B369-F67C067E940D}" type="datetimeFigureOut">
               <a:rPr lang="pt-BR" smtClean="0"/>
-              <a:t>05/05/2020</a:t>
+              <a:t>06/05/2020</a:t>
             </a:fld>
             <a:endParaRPr lang="pt-BR"/>
           </a:p>
@@ -2786,7 +2788,7 @@
           <a:p>
             <a:fld id="{15B003F1-72A3-4565-B369-F67C067E940D}" type="datetimeFigureOut">
               <a:rPr lang="pt-BR" smtClean="0"/>
-              <a:t>05/05/2020</a:t>
+              <a:t>06/05/2020</a:t>
             </a:fld>
             <a:endParaRPr lang="pt-BR"/>
           </a:p>
@@ -3077,7 +3079,7 @@
           <a:p>
             <a:fld id="{15B003F1-72A3-4565-B369-F67C067E940D}" type="datetimeFigureOut">
               <a:rPr lang="pt-BR" smtClean="0"/>
-              <a:t>05/05/2020</a:t>
+              <a:t>06/05/2020</a:t>
             </a:fld>
             <a:endParaRPr lang="pt-BR"/>
           </a:p>
@@ -3321,7 +3323,7 @@
           <a:p>
             <a:fld id="{15B003F1-72A3-4565-B369-F67C067E940D}" type="datetimeFigureOut">
               <a:rPr lang="pt-BR" smtClean="0"/>
-              <a:t>05/05/2020</a:t>
+              <a:t>06/05/2020</a:t>
             </a:fld>
             <a:endParaRPr lang="pt-BR"/>
           </a:p>
@@ -5403,14 +5405,6 @@
 <file path=ppt/slides/slide19.xml><?xml version="1.0" encoding="utf-8"?>
 <p:sld xmlns:a="http://schemas.openxmlformats.org/drawingml/2006/main" xmlns:r="http://schemas.openxmlformats.org/officeDocument/2006/relationships" xmlns:p="http://schemas.openxmlformats.org/presentationml/2006/main">
   <p:cSld>
-    <p:bg>
-      <p:bgPr>
-        <a:solidFill>
-          <a:schemeClr val="bg1"/>
-        </a:solidFill>
-        <a:effectLst/>
-      </p:bgPr>
-    </p:bg>
     <p:spTree>
       <p:nvGrpSpPr>
         <p:cNvPr id="1" name=""/>
@@ -5425,75 +5419,12 @@
           <a:chExt cx="0" cy="0"/>
         </a:xfrm>
       </p:grpSpPr>
-      <p:sp>
-        <p:nvSpPr>
-          <p:cNvPr id="16" name="Rectangle 15">
-            <a:extLst>
-              <a:ext uri="{FF2B5EF4-FFF2-40B4-BE49-F238E27FC236}">
-                <a16:creationId xmlns:a16="http://schemas.microsoft.com/office/drawing/2014/main" id="{B4D3D850-2041-4B7C-AED9-54DA385B14F7}"/>
-              </a:ext>
-              <a:ext uri="{C183D7F6-B498-43B3-948B-1728B52AA6E4}">
-                <adec:decorative xmlns:adec="http://schemas.microsoft.com/office/drawing/2017/decorative" val="1"/>
-              </a:ext>
-            </a:extLst>
-          </p:cNvPr>
-          <p:cNvSpPr>
-            <a:spLocks noGrp="1" noRot="1" noChangeAspect="1" noMove="1" noResize="1" noEditPoints="1" noAdjustHandles="1" noChangeArrowheads="1" noChangeShapeType="1" noTextEdit="1"/>
-          </p:cNvSpPr>
-          <p:nvPr>
-            <p:extLst>
-              <p:ext uri="{386F3935-93C4-4BCD-93E2-E3B085C9AB24}">
-                <p16:designElem xmlns:p16="http://schemas.microsoft.com/office/powerpoint/2015/main" val="1"/>
-              </p:ext>
-            </p:extLst>
-          </p:nvPr>
-        </p:nvSpPr>
-        <p:spPr>
-          <a:xfrm>
-            <a:off x="0" y="0"/>
-            <a:ext cx="12192000" cy="6858000"/>
-          </a:xfrm>
-          <a:prstGeom prst="rect">
-            <a:avLst/>
-          </a:prstGeom>
-          <a:solidFill>
-            <a:schemeClr val="bg2"/>
-          </a:solidFill>
-          <a:ln>
-            <a:noFill/>
-          </a:ln>
-        </p:spPr>
-        <p:style>
-          <a:lnRef idx="2">
-            <a:schemeClr val="accent1">
-              <a:shade val="50000"/>
-            </a:schemeClr>
-          </a:lnRef>
-          <a:fillRef idx="1">
-            <a:schemeClr val="accent1"/>
-          </a:fillRef>
-          <a:effectRef idx="0">
-            <a:schemeClr val="accent1"/>
-          </a:effectRef>
-          <a:fontRef idx="minor">
-            <a:schemeClr val="lt1"/>
-          </a:fontRef>
-        </p:style>
-        <p:txBody>
-          <a:bodyPr rtlCol="0" anchor="ctr"/>
-          <a:lstStyle/>
-          <a:p>
-            <a:pPr algn="ctr"/>
-            <a:endParaRPr lang="en-US" dirty="0"/>
-          </a:p>
-        </p:txBody>
-      </p:sp>
       <p:pic>
         <p:nvPicPr>
-          <p:cNvPr id="5" name="Imagem 4" descr="Uma imagem contendo placar, desenho, relógio&#10;&#10;Descrição gerada automaticamente">
-            <a:extLst>
-              <a:ext uri="{FF2B5EF4-FFF2-40B4-BE49-F238E27FC236}">
-                <a16:creationId xmlns:a16="http://schemas.microsoft.com/office/drawing/2014/main" id="{5DF5D51C-359F-4617-A452-01B736753090}"/>
+          <p:cNvPr id="6" name="Picture 6" descr="A picture containing large, white&#10;&#10;Description generated with very high confidence">
+            <a:extLst>
+              <a:ext uri="{FF2B5EF4-FFF2-40B4-BE49-F238E27FC236}">
+                <a16:creationId xmlns:a16="http://schemas.microsoft.com/office/drawing/2014/main" id="{C33196A0-8DD7-483A-A601-A7AECB23A20F}"/>
               </a:ext>
             </a:extLst>
           </p:cNvPr>
@@ -5502,21 +5433,16 @@
           </p:cNvPicPr>
           <p:nvPr/>
         </p:nvPicPr>
-        <p:blipFill rotWithShape="1">
-          <a:blip r:embed="rId2">
-            <a:extLst>
-              <a:ext uri="{28A0092B-C50C-407E-A947-70E740481C1C}">
-                <a14:useLocalDpi xmlns:a14="http://schemas.microsoft.com/office/drawing/2010/main" val="0"/>
-              </a:ext>
-            </a:extLst>
-          </a:blip>
-          <a:srcRect l="9796" r="1319" b="4"/>
-          <a:stretch/>
+        <p:blipFill>
+          <a:blip r:embed="rId2"/>
+          <a:stretch>
+            <a:fillRect/>
+          </a:stretch>
         </p:blipFill>
         <p:spPr>
           <a:xfrm>
-            <a:off x="20" y="10"/>
-            <a:ext cx="6095980" cy="6857990"/>
+            <a:off x="420405" y="1319787"/>
+            <a:ext cx="4350706" cy="5152134"/>
           </a:xfrm>
           <a:prstGeom prst="rect">
             <a:avLst/>
@@ -5525,10 +5451,10 @@
       </p:pic>
       <p:pic>
         <p:nvPicPr>
-          <p:cNvPr id="11" name="Imagem 10" descr="Uma imagem contendo texto, placar&#10;&#10;Descrição gerada automaticamente">
-            <a:extLst>
-              <a:ext uri="{FF2B5EF4-FFF2-40B4-BE49-F238E27FC236}">
-                <a16:creationId xmlns:a16="http://schemas.microsoft.com/office/drawing/2014/main" id="{4DC099E3-271D-4053-AB28-D8157177161D}"/>
+          <p:cNvPr id="8" name="Picture 8" descr="A screenshot of a cell phone&#10;&#10;Description generated with very high confidence">
+            <a:extLst>
+              <a:ext uri="{FF2B5EF4-FFF2-40B4-BE49-F238E27FC236}">
+                <a16:creationId xmlns:a16="http://schemas.microsoft.com/office/drawing/2014/main" id="{4B2BF772-0180-4C8F-B6DF-CB3BA53F8772}"/>
               </a:ext>
             </a:extLst>
           </p:cNvPr>
@@ -5537,216 +5463,56 @@
           </p:cNvPicPr>
           <p:nvPr/>
         </p:nvPicPr>
-        <p:blipFill rotWithShape="1">
-          <a:blip r:embed="rId3">
-            <a:extLst>
-              <a:ext uri="{28A0092B-C50C-407E-A947-70E740481C1C}">
-                <a14:useLocalDpi xmlns:a14="http://schemas.microsoft.com/office/drawing/2010/main" val="0"/>
-              </a:ext>
-            </a:extLst>
-          </a:blip>
-          <a:srcRect l="3614" r="7500" b="4"/>
-          <a:stretch/>
+        <p:blipFill>
+          <a:blip r:embed="rId3"/>
+          <a:stretch>
+            <a:fillRect/>
+          </a:stretch>
         </p:blipFill>
         <p:spPr>
           <a:xfrm>
-            <a:off x="6096000" y="10"/>
-            <a:ext cx="6096000" cy="6857990"/>
+            <a:off x="4922730" y="1322484"/>
+            <a:ext cx="7064679" cy="1060646"/>
           </a:xfrm>
           <a:prstGeom prst="rect">
             <a:avLst/>
           </a:prstGeom>
         </p:spPr>
       </p:pic>
-      <p:sp>
-        <p:nvSpPr>
-          <p:cNvPr id="18" name="Rectangle 17">
-            <a:extLst>
-              <a:ext uri="{FF2B5EF4-FFF2-40B4-BE49-F238E27FC236}">
-                <a16:creationId xmlns:a16="http://schemas.microsoft.com/office/drawing/2014/main" id="{B497CCB5-5FC2-473C-AFCC-2430CEF1DF71}"/>
-              </a:ext>
-              <a:ext uri="{C183D7F6-B498-43B3-948B-1728B52AA6E4}">
-                <adec:decorative xmlns:adec="http://schemas.microsoft.com/office/drawing/2017/decorative" val="1"/>
-              </a:ext>
-            </a:extLst>
-          </p:cNvPr>
-          <p:cNvSpPr>
-            <a:spLocks noGrp="1" noRot="1" noChangeAspect="1" noMove="1" noResize="1" noEditPoints="1" noAdjustHandles="1" noChangeArrowheads="1" noChangeShapeType="1" noTextEdit="1"/>
-          </p:cNvSpPr>
-          <p:nvPr>
-            <p:extLst>
-              <p:ext uri="{386F3935-93C4-4BCD-93E2-E3B085C9AB24}">
-                <p16:designElem xmlns:p16="http://schemas.microsoft.com/office/powerpoint/2015/main" val="1"/>
-              </p:ext>
-            </p:extLst>
-          </p:nvPr>
-        </p:nvSpPr>
-        <p:spPr>
-          <a:xfrm rot="2700000">
-            <a:off x="4409915" y="1742916"/>
-            <a:ext cx="3372170" cy="3372168"/>
+      <p:pic>
+        <p:nvPicPr>
+          <p:cNvPr id="20" name="Picture 20" descr="A screenshot of a cell phone&#10;&#10;Description generated with very high confidence">
+            <a:extLst>
+              <a:ext uri="{FF2B5EF4-FFF2-40B4-BE49-F238E27FC236}">
+                <a16:creationId xmlns:a16="http://schemas.microsoft.com/office/drawing/2014/main" id="{7D94B037-2AC7-40DF-94B0-AFE6DFD99575}"/>
+              </a:ext>
+            </a:extLst>
+          </p:cNvPr>
+          <p:cNvPicPr>
+            <a:picLocks noChangeAspect="1"/>
+          </p:cNvPicPr>
+          <p:nvPr/>
+        </p:nvPicPr>
+        <p:blipFill>
+          <a:blip r:embed="rId4"/>
+          <a:stretch>
+            <a:fillRect/>
+          </a:stretch>
+        </p:blipFill>
+        <p:spPr>
+          <a:xfrm>
+            <a:off x="4922728" y="2497912"/>
+            <a:ext cx="7064678" cy="830605"/>
           </a:xfrm>
           <a:prstGeom prst="rect">
             <a:avLst/>
           </a:prstGeom>
-          <a:solidFill>
-            <a:srgbClr val="FFFFFF"/>
-          </a:solidFill>
-          <a:ln>
-            <a:noFill/>
-          </a:ln>
-        </p:spPr>
-        <p:style>
-          <a:lnRef idx="2">
-            <a:schemeClr val="accent1">
-              <a:shade val="50000"/>
-            </a:schemeClr>
-          </a:lnRef>
-          <a:fillRef idx="1">
-            <a:schemeClr val="accent1"/>
-          </a:fillRef>
-          <a:effectRef idx="0">
-            <a:schemeClr val="accent1"/>
-          </a:effectRef>
-          <a:fontRef idx="minor">
-            <a:schemeClr val="lt1"/>
-          </a:fontRef>
-        </p:style>
-        <p:txBody>
-          <a:bodyPr rtlCol="0" anchor="ctr"/>
-          <a:lstStyle/>
-          <a:p>
-            <a:pPr algn="ctr"/>
-            <a:endParaRPr lang="en-US"/>
-          </a:p>
-        </p:txBody>
-      </p:sp>
-      <p:sp>
-        <p:nvSpPr>
-          <p:cNvPr id="20" name="Frame 19">
-            <a:extLst>
-              <a:ext uri="{FF2B5EF4-FFF2-40B4-BE49-F238E27FC236}">
-                <a16:creationId xmlns:a16="http://schemas.microsoft.com/office/drawing/2014/main" id="{599C8C75-BFDF-44E7-A028-EEB5EDD58817}"/>
-              </a:ext>
-              <a:ext uri="{C183D7F6-B498-43B3-948B-1728B52AA6E4}">
-                <adec:decorative xmlns:adec="http://schemas.microsoft.com/office/drawing/2017/decorative" val="1"/>
-              </a:ext>
-            </a:extLst>
-          </p:cNvPr>
-          <p:cNvSpPr>
-            <a:spLocks noGrp="1" noRot="1" noChangeAspect="1" noMove="1" noResize="1" noEditPoints="1" noAdjustHandles="1" noChangeArrowheads="1" noChangeShapeType="1" noTextEdit="1"/>
-          </p:cNvSpPr>
-          <p:nvPr>
-            <p:extLst>
-              <p:ext uri="{386F3935-93C4-4BCD-93E2-E3B085C9AB24}">
-                <p16:designElem xmlns:p16="http://schemas.microsoft.com/office/powerpoint/2015/main" val="1"/>
-              </p:ext>
-            </p:extLst>
-          </p:nvPr>
-        </p:nvSpPr>
-        <p:spPr>
-          <a:xfrm rot="2700000">
-            <a:off x="3971277" y="1304278"/>
-            <a:ext cx="4249446" cy="4249444"/>
-          </a:xfrm>
-          <a:prstGeom prst="frame">
-            <a:avLst>
-              <a:gd name="adj1" fmla="val 1195"/>
-            </a:avLst>
-          </a:prstGeom>
-          <a:solidFill>
-            <a:srgbClr val="FFFFFF">
-              <a:alpha val="60000"/>
-            </a:srgbClr>
-          </a:solidFill>
-          <a:ln>
-            <a:noFill/>
-          </a:ln>
-        </p:spPr>
-        <p:style>
-          <a:lnRef idx="2">
-            <a:schemeClr val="accent1">
-              <a:shade val="50000"/>
-            </a:schemeClr>
-          </a:lnRef>
-          <a:fillRef idx="1">
-            <a:schemeClr val="accent1"/>
-          </a:fillRef>
-          <a:effectRef idx="0">
-            <a:schemeClr val="accent1"/>
-          </a:effectRef>
-          <a:fontRef idx="minor">
-            <a:schemeClr val="lt1"/>
-          </a:fontRef>
-        </p:style>
-        <p:txBody>
-          <a:bodyPr rtlCol="0" anchor="ctr"/>
-          <a:lstStyle/>
-          <a:p>
-            <a:pPr algn="ctr"/>
-            <a:endParaRPr lang="en-US">
-              <a:solidFill>
-                <a:schemeClr val="tx1"/>
-              </a:solidFill>
-            </a:endParaRPr>
-          </a:p>
-        </p:txBody>
-      </p:sp>
-      <p:sp>
-        <p:nvSpPr>
-          <p:cNvPr id="2" name="Título 1">
-            <a:extLst>
-              <a:ext uri="{FF2B5EF4-FFF2-40B4-BE49-F238E27FC236}">
-                <a16:creationId xmlns:a16="http://schemas.microsoft.com/office/drawing/2014/main" id="{3D029D57-35BF-42EE-9D31-EAB20BE9EA4E}"/>
-              </a:ext>
-            </a:extLst>
-          </p:cNvPr>
-          <p:cNvSpPr>
-            <a:spLocks noGrp="1"/>
-          </p:cNvSpPr>
-          <p:nvPr>
-            <p:ph type="title"/>
-          </p:nvPr>
-        </p:nvSpPr>
-        <p:spPr>
-          <a:xfrm>
-            <a:off x="3795880" y="2675117"/>
-            <a:ext cx="4600239" cy="1507765"/>
-          </a:xfrm>
-          <a:noFill/>
-        </p:spPr>
-        <p:txBody>
-          <a:bodyPr vert="horz" lIns="91440" tIns="45720" rIns="91440" bIns="45720" rtlCol="0" anchor="ctr">
-            <a:normAutofit/>
-          </a:bodyPr>
-          <a:lstStyle/>
-          <a:p>
-            <a:pPr algn="ctr"/>
-            <a:r>
-              <a:rPr lang="en-US" sz="3600" dirty="0">
-                <a:solidFill>
-                  <a:srgbClr val="080808"/>
-                </a:solidFill>
-                <a:latin typeface="Bariol Bold" panose="02000506040000020003"/>
-              </a:rPr>
-              <a:t>D</a:t>
-            </a:r>
-            <a:r>
-              <a:rPr lang="en-US" sz="3600" kern="1200" dirty="0">
-                <a:solidFill>
-                  <a:srgbClr val="080808"/>
-                </a:solidFill>
-                <a:latin typeface="Bariol Bold" panose="02000506040000020003"/>
-              </a:rPr>
-              <a:t>ashboard</a:t>
-            </a:r>
-          </a:p>
-        </p:txBody>
-      </p:sp>
+        </p:spPr>
+      </p:pic>
     </p:spTree>
     <p:extLst>
       <p:ext uri="{BB962C8B-B14F-4D97-AF65-F5344CB8AC3E}">
-        <p14:creationId xmlns:p14="http://schemas.microsoft.com/office/powerpoint/2010/main" val="2809380215"/>
+        <p14:creationId xmlns:p14="http://schemas.microsoft.com/office/powerpoint/2010/main" val="1560843983"/>
       </p:ext>
     </p:extLst>
   </p:cSld>
@@ -6710,6 +6476,365 @@
 <file path=ppt/slides/slide20.xml><?xml version="1.0" encoding="utf-8"?>
 <p:sld xmlns:a="http://schemas.openxmlformats.org/drawingml/2006/main" xmlns:r="http://schemas.openxmlformats.org/officeDocument/2006/relationships" xmlns:p="http://schemas.openxmlformats.org/presentationml/2006/main">
   <p:cSld>
+    <p:bg>
+      <p:bgPr>
+        <a:solidFill>
+          <a:schemeClr val="bg1"/>
+        </a:solidFill>
+        <a:effectLst/>
+      </p:bgPr>
+    </p:bg>
+    <p:spTree>
+      <p:nvGrpSpPr>
+        <p:cNvPr id="1" name=""/>
+        <p:cNvGrpSpPr/>
+        <p:nvPr/>
+      </p:nvGrpSpPr>
+      <p:grpSpPr>
+        <a:xfrm>
+          <a:off x="0" y="0"/>
+          <a:ext cx="0" cy="0"/>
+          <a:chOff x="0" y="0"/>
+          <a:chExt cx="0" cy="0"/>
+        </a:xfrm>
+      </p:grpSpPr>
+      <p:sp>
+        <p:nvSpPr>
+          <p:cNvPr id="16" name="Rectangle 15">
+            <a:extLst>
+              <a:ext uri="{FF2B5EF4-FFF2-40B4-BE49-F238E27FC236}">
+                <a16:creationId xmlns:a16="http://schemas.microsoft.com/office/drawing/2014/main" id="{B4D3D850-2041-4B7C-AED9-54DA385B14F7}"/>
+              </a:ext>
+              <a:ext uri="{C183D7F6-B498-43B3-948B-1728B52AA6E4}">
+                <adec:decorative xmlns:adec="http://schemas.microsoft.com/office/drawing/2017/decorative" val="1"/>
+              </a:ext>
+            </a:extLst>
+          </p:cNvPr>
+          <p:cNvSpPr>
+            <a:spLocks noGrp="1" noRot="1" noChangeAspect="1" noMove="1" noResize="1" noEditPoints="1" noAdjustHandles="1" noChangeArrowheads="1" noChangeShapeType="1" noTextEdit="1"/>
+          </p:cNvSpPr>
+          <p:nvPr>
+            <p:extLst>
+              <p:ext uri="{386F3935-93C4-4BCD-93E2-E3B085C9AB24}">
+                <p16:designElem xmlns:p16="http://schemas.microsoft.com/office/powerpoint/2015/main" val="1"/>
+              </p:ext>
+            </p:extLst>
+          </p:nvPr>
+        </p:nvSpPr>
+        <p:spPr>
+          <a:xfrm>
+            <a:off x="0" y="0"/>
+            <a:ext cx="12192000" cy="6858000"/>
+          </a:xfrm>
+          <a:prstGeom prst="rect">
+            <a:avLst/>
+          </a:prstGeom>
+          <a:solidFill>
+            <a:schemeClr val="bg2"/>
+          </a:solidFill>
+          <a:ln>
+            <a:noFill/>
+          </a:ln>
+        </p:spPr>
+        <p:style>
+          <a:lnRef idx="2">
+            <a:schemeClr val="accent1">
+              <a:shade val="50000"/>
+            </a:schemeClr>
+          </a:lnRef>
+          <a:fillRef idx="1">
+            <a:schemeClr val="accent1"/>
+          </a:fillRef>
+          <a:effectRef idx="0">
+            <a:schemeClr val="accent1"/>
+          </a:effectRef>
+          <a:fontRef idx="minor">
+            <a:schemeClr val="lt1"/>
+          </a:fontRef>
+        </p:style>
+        <p:txBody>
+          <a:bodyPr rtlCol="0" anchor="ctr"/>
+          <a:lstStyle/>
+          <a:p>
+            <a:pPr algn="ctr"/>
+            <a:endParaRPr lang="en-US" dirty="0"/>
+          </a:p>
+        </p:txBody>
+      </p:sp>
+      <p:pic>
+        <p:nvPicPr>
+          <p:cNvPr id="5" name="Imagem 4" descr="Uma imagem contendo placar, desenho, relógio&#10;&#10;Descrição gerada automaticamente">
+            <a:extLst>
+              <a:ext uri="{FF2B5EF4-FFF2-40B4-BE49-F238E27FC236}">
+                <a16:creationId xmlns:a16="http://schemas.microsoft.com/office/drawing/2014/main" id="{5DF5D51C-359F-4617-A452-01B736753090}"/>
+              </a:ext>
+            </a:extLst>
+          </p:cNvPr>
+          <p:cNvPicPr>
+            <a:picLocks noChangeAspect="1"/>
+          </p:cNvPicPr>
+          <p:nvPr/>
+        </p:nvPicPr>
+        <p:blipFill rotWithShape="1">
+          <a:blip r:embed="rId2">
+            <a:extLst>
+              <a:ext uri="{28A0092B-C50C-407E-A947-70E740481C1C}">
+                <a14:useLocalDpi xmlns:a14="http://schemas.microsoft.com/office/drawing/2010/main" val="0"/>
+              </a:ext>
+            </a:extLst>
+          </a:blip>
+          <a:srcRect l="9796" r="1319" b="4"/>
+          <a:stretch/>
+        </p:blipFill>
+        <p:spPr>
+          <a:xfrm>
+            <a:off x="20" y="10"/>
+            <a:ext cx="6095980" cy="6857990"/>
+          </a:xfrm>
+          <a:prstGeom prst="rect">
+            <a:avLst/>
+          </a:prstGeom>
+        </p:spPr>
+      </p:pic>
+      <p:pic>
+        <p:nvPicPr>
+          <p:cNvPr id="11" name="Imagem 10" descr="Uma imagem contendo texto, placar&#10;&#10;Descrição gerada automaticamente">
+            <a:extLst>
+              <a:ext uri="{FF2B5EF4-FFF2-40B4-BE49-F238E27FC236}">
+                <a16:creationId xmlns:a16="http://schemas.microsoft.com/office/drawing/2014/main" id="{4DC099E3-271D-4053-AB28-D8157177161D}"/>
+              </a:ext>
+            </a:extLst>
+          </p:cNvPr>
+          <p:cNvPicPr>
+            <a:picLocks noChangeAspect="1"/>
+          </p:cNvPicPr>
+          <p:nvPr/>
+        </p:nvPicPr>
+        <p:blipFill rotWithShape="1">
+          <a:blip r:embed="rId3">
+            <a:extLst>
+              <a:ext uri="{28A0092B-C50C-407E-A947-70E740481C1C}">
+                <a14:useLocalDpi xmlns:a14="http://schemas.microsoft.com/office/drawing/2010/main" val="0"/>
+              </a:ext>
+            </a:extLst>
+          </a:blip>
+          <a:srcRect l="3614" r="7500" b="4"/>
+          <a:stretch/>
+        </p:blipFill>
+        <p:spPr>
+          <a:xfrm>
+            <a:off x="6096000" y="10"/>
+            <a:ext cx="6096000" cy="6857990"/>
+          </a:xfrm>
+          <a:prstGeom prst="rect">
+            <a:avLst/>
+          </a:prstGeom>
+        </p:spPr>
+      </p:pic>
+      <p:sp>
+        <p:nvSpPr>
+          <p:cNvPr id="18" name="Rectangle 17">
+            <a:extLst>
+              <a:ext uri="{FF2B5EF4-FFF2-40B4-BE49-F238E27FC236}">
+                <a16:creationId xmlns:a16="http://schemas.microsoft.com/office/drawing/2014/main" id="{B497CCB5-5FC2-473C-AFCC-2430CEF1DF71}"/>
+              </a:ext>
+              <a:ext uri="{C183D7F6-B498-43B3-948B-1728B52AA6E4}">
+                <adec:decorative xmlns:adec="http://schemas.microsoft.com/office/drawing/2017/decorative" val="1"/>
+              </a:ext>
+            </a:extLst>
+          </p:cNvPr>
+          <p:cNvSpPr>
+            <a:spLocks noGrp="1" noRot="1" noChangeAspect="1" noMove="1" noResize="1" noEditPoints="1" noAdjustHandles="1" noChangeArrowheads="1" noChangeShapeType="1" noTextEdit="1"/>
+          </p:cNvSpPr>
+          <p:nvPr>
+            <p:extLst>
+              <p:ext uri="{386F3935-93C4-4BCD-93E2-E3B085C9AB24}">
+                <p16:designElem xmlns:p16="http://schemas.microsoft.com/office/powerpoint/2015/main" val="1"/>
+              </p:ext>
+            </p:extLst>
+          </p:nvPr>
+        </p:nvSpPr>
+        <p:spPr>
+          <a:xfrm rot="2700000">
+            <a:off x="4409915" y="1742916"/>
+            <a:ext cx="3372170" cy="3372168"/>
+          </a:xfrm>
+          <a:prstGeom prst="rect">
+            <a:avLst/>
+          </a:prstGeom>
+          <a:solidFill>
+            <a:srgbClr val="FFFFFF"/>
+          </a:solidFill>
+          <a:ln>
+            <a:noFill/>
+          </a:ln>
+        </p:spPr>
+        <p:style>
+          <a:lnRef idx="2">
+            <a:schemeClr val="accent1">
+              <a:shade val="50000"/>
+            </a:schemeClr>
+          </a:lnRef>
+          <a:fillRef idx="1">
+            <a:schemeClr val="accent1"/>
+          </a:fillRef>
+          <a:effectRef idx="0">
+            <a:schemeClr val="accent1"/>
+          </a:effectRef>
+          <a:fontRef idx="minor">
+            <a:schemeClr val="lt1"/>
+          </a:fontRef>
+        </p:style>
+        <p:txBody>
+          <a:bodyPr rtlCol="0" anchor="ctr"/>
+          <a:lstStyle/>
+          <a:p>
+            <a:pPr algn="ctr"/>
+            <a:endParaRPr lang="en-US"/>
+          </a:p>
+        </p:txBody>
+      </p:sp>
+      <p:sp>
+        <p:nvSpPr>
+          <p:cNvPr id="20" name="Frame 19">
+            <a:extLst>
+              <a:ext uri="{FF2B5EF4-FFF2-40B4-BE49-F238E27FC236}">
+                <a16:creationId xmlns:a16="http://schemas.microsoft.com/office/drawing/2014/main" id="{599C8C75-BFDF-44E7-A028-EEB5EDD58817}"/>
+              </a:ext>
+              <a:ext uri="{C183D7F6-B498-43B3-948B-1728B52AA6E4}">
+                <adec:decorative xmlns:adec="http://schemas.microsoft.com/office/drawing/2017/decorative" val="1"/>
+              </a:ext>
+            </a:extLst>
+          </p:cNvPr>
+          <p:cNvSpPr>
+            <a:spLocks noGrp="1" noRot="1" noChangeAspect="1" noMove="1" noResize="1" noEditPoints="1" noAdjustHandles="1" noChangeArrowheads="1" noChangeShapeType="1" noTextEdit="1"/>
+          </p:cNvSpPr>
+          <p:nvPr>
+            <p:extLst>
+              <p:ext uri="{386F3935-93C4-4BCD-93E2-E3B085C9AB24}">
+                <p16:designElem xmlns:p16="http://schemas.microsoft.com/office/powerpoint/2015/main" val="1"/>
+              </p:ext>
+            </p:extLst>
+          </p:nvPr>
+        </p:nvSpPr>
+        <p:spPr>
+          <a:xfrm rot="2700000">
+            <a:off x="3971277" y="1304278"/>
+            <a:ext cx="4249446" cy="4249444"/>
+          </a:xfrm>
+          <a:prstGeom prst="frame">
+            <a:avLst>
+              <a:gd name="adj1" fmla="val 1195"/>
+            </a:avLst>
+          </a:prstGeom>
+          <a:solidFill>
+            <a:srgbClr val="FFFFFF">
+              <a:alpha val="60000"/>
+            </a:srgbClr>
+          </a:solidFill>
+          <a:ln>
+            <a:noFill/>
+          </a:ln>
+        </p:spPr>
+        <p:style>
+          <a:lnRef idx="2">
+            <a:schemeClr val="accent1">
+              <a:shade val="50000"/>
+            </a:schemeClr>
+          </a:lnRef>
+          <a:fillRef idx="1">
+            <a:schemeClr val="accent1"/>
+          </a:fillRef>
+          <a:effectRef idx="0">
+            <a:schemeClr val="accent1"/>
+          </a:effectRef>
+          <a:fontRef idx="minor">
+            <a:schemeClr val="lt1"/>
+          </a:fontRef>
+        </p:style>
+        <p:txBody>
+          <a:bodyPr rtlCol="0" anchor="ctr"/>
+          <a:lstStyle/>
+          <a:p>
+            <a:pPr algn="ctr"/>
+            <a:endParaRPr lang="en-US">
+              <a:solidFill>
+                <a:schemeClr val="tx1"/>
+              </a:solidFill>
+            </a:endParaRPr>
+          </a:p>
+        </p:txBody>
+      </p:sp>
+      <p:sp>
+        <p:nvSpPr>
+          <p:cNvPr id="2" name="Título 1">
+            <a:extLst>
+              <a:ext uri="{FF2B5EF4-FFF2-40B4-BE49-F238E27FC236}">
+                <a16:creationId xmlns:a16="http://schemas.microsoft.com/office/drawing/2014/main" id="{3D029D57-35BF-42EE-9D31-EAB20BE9EA4E}"/>
+              </a:ext>
+            </a:extLst>
+          </p:cNvPr>
+          <p:cNvSpPr>
+            <a:spLocks noGrp="1"/>
+          </p:cNvSpPr>
+          <p:nvPr>
+            <p:ph type="title"/>
+          </p:nvPr>
+        </p:nvSpPr>
+        <p:spPr>
+          <a:xfrm>
+            <a:off x="3795880" y="2675117"/>
+            <a:ext cx="4600239" cy="1507765"/>
+          </a:xfrm>
+          <a:noFill/>
+        </p:spPr>
+        <p:txBody>
+          <a:bodyPr vert="horz" lIns="91440" tIns="45720" rIns="91440" bIns="45720" rtlCol="0" anchor="ctr">
+            <a:normAutofit/>
+          </a:bodyPr>
+          <a:lstStyle/>
+          <a:p>
+            <a:pPr algn="ctr"/>
+            <a:r>
+              <a:rPr lang="en-US" sz="3600" dirty="0">
+                <a:solidFill>
+                  <a:srgbClr val="080808"/>
+                </a:solidFill>
+                <a:latin typeface="Bariol Bold" panose="02000506040000020003"/>
+              </a:rPr>
+              <a:t>D</a:t>
+            </a:r>
+            <a:r>
+              <a:rPr lang="en-US" sz="3600" kern="1200" dirty="0">
+                <a:solidFill>
+                  <a:srgbClr val="080808"/>
+                </a:solidFill>
+                <a:latin typeface="Bariol Bold" panose="02000506040000020003"/>
+              </a:rPr>
+              <a:t>ashboard</a:t>
+            </a:r>
+          </a:p>
+        </p:txBody>
+      </p:sp>
+    </p:spTree>
+    <p:extLst>
+      <p:ext uri="{BB962C8B-B14F-4D97-AF65-F5344CB8AC3E}">
+        <p14:creationId xmlns:p14="http://schemas.microsoft.com/office/powerpoint/2010/main" val="2809380215"/>
+      </p:ext>
+    </p:extLst>
+  </p:cSld>
+  <p:clrMapOvr>
+    <a:masterClrMapping/>
+  </p:clrMapOvr>
+  <p:transition>
+    <p:fade/>
+  </p:transition>
+</p:sld>
+</file>
+
+<file path=ppt/slides/slide21.xml><?xml version="1.0" encoding="utf-8"?>
+<p:sld xmlns:a="http://schemas.openxmlformats.org/drawingml/2006/main" xmlns:r="http://schemas.openxmlformats.org/officeDocument/2006/relationships" xmlns:p="http://schemas.openxmlformats.org/presentationml/2006/main">
+  <p:cSld>
     <p:spTree>
       <p:nvGrpSpPr>
         <p:cNvPr id="1" name=""/>
@@ -6818,7 +6943,7 @@
                 </a:solidFill>
                 <a:latin typeface="Bariol Bold" panose="02000506040000020003" pitchFamily="2" charset="0"/>
               </a:rPr>
-              <a:t>Banco de Dados (Protótipo)</a:t>
+              <a:t>Banco de Dados </a:t>
             </a:r>
           </a:p>
         </p:txBody>
@@ -6863,6 +6988,156 @@
     <p:extLst>
       <p:ext uri="{BB962C8B-B14F-4D97-AF65-F5344CB8AC3E}">
         <p14:creationId xmlns:p14="http://schemas.microsoft.com/office/powerpoint/2010/main" val="221675555"/>
+      </p:ext>
+    </p:extLst>
+  </p:cSld>
+  <p:clrMapOvr>
+    <a:masterClrMapping/>
+  </p:clrMapOvr>
+  <p:transition>
+    <p:fade/>
+  </p:transition>
+</p:sld>
+</file>
+
+<file path=ppt/slides/slide22.xml><?xml version="1.0" encoding="utf-8"?>
+<p:sld xmlns:a="http://schemas.openxmlformats.org/drawingml/2006/main" xmlns:r="http://schemas.openxmlformats.org/officeDocument/2006/relationships" xmlns:p="http://schemas.openxmlformats.org/presentationml/2006/main">
+  <p:cSld>
+    <p:bg>
+      <p:bgPr>
+        <a:solidFill>
+          <a:schemeClr val="bg1"/>
+        </a:solidFill>
+        <a:effectLst/>
+      </p:bgPr>
+    </p:bg>
+    <p:spTree>
+      <p:nvGrpSpPr>
+        <p:cNvPr id="1" name=""/>
+        <p:cNvGrpSpPr/>
+        <p:nvPr/>
+      </p:nvGrpSpPr>
+      <p:grpSpPr>
+        <a:xfrm>
+          <a:off x="0" y="0"/>
+          <a:ext cx="0" cy="0"/>
+          <a:chOff x="0" y="0"/>
+          <a:chExt cx="0" cy="0"/>
+        </a:xfrm>
+      </p:grpSpPr>
+      <p:pic>
+        <p:nvPicPr>
+          <p:cNvPr id="2" name="Imagem 1">
+            <a:extLst>
+              <a:ext uri="{FF2B5EF4-FFF2-40B4-BE49-F238E27FC236}">
+                <a16:creationId xmlns:a16="http://schemas.microsoft.com/office/drawing/2014/main" id="{40EC7EB7-3280-44B2-8C3A-07A7FA081524}"/>
+              </a:ext>
+            </a:extLst>
+          </p:cNvPr>
+          <p:cNvPicPr>
+            <a:picLocks noChangeAspect="1"/>
+          </p:cNvPicPr>
+          <p:nvPr/>
+        </p:nvPicPr>
+        <p:blipFill>
+          <a:blip r:embed="rId2"/>
+          <a:stretch>
+            <a:fillRect/>
+          </a:stretch>
+        </p:blipFill>
+        <p:spPr>
+          <a:xfrm>
+            <a:off x="2435104" y="817579"/>
+            <a:ext cx="7321792" cy="5509648"/>
+          </a:xfrm>
+          <a:prstGeom prst="rect">
+            <a:avLst/>
+          </a:prstGeom>
+        </p:spPr>
+      </p:pic>
+      <p:pic>
+        <p:nvPicPr>
+          <p:cNvPr id="12" name="Imagem 11" descr="Uma imagem contendo texto, desenho&#10;&#10;Descrição gerada automaticamente">
+            <a:extLst>
+              <a:ext uri="{FF2B5EF4-FFF2-40B4-BE49-F238E27FC236}">
+                <a16:creationId xmlns:a16="http://schemas.microsoft.com/office/drawing/2014/main" id="{A0AB590B-CCCF-4778-84B6-545212F021A2}"/>
+              </a:ext>
+            </a:extLst>
+          </p:cNvPr>
+          <p:cNvPicPr>
+            <a:picLocks noChangeAspect="1"/>
+          </p:cNvPicPr>
+          <p:nvPr/>
+        </p:nvPicPr>
+        <p:blipFill>
+          <a:blip r:embed="rId3" cstate="hqprint">
+            <a:extLst>
+              <a:ext uri="{28A0092B-C50C-407E-A947-70E740481C1C}">
+                <a14:useLocalDpi xmlns:a14="http://schemas.microsoft.com/office/drawing/2010/main" val="0"/>
+              </a:ext>
+            </a:extLst>
+          </a:blip>
+          <a:stretch>
+            <a:fillRect/>
+          </a:stretch>
+        </p:blipFill>
+        <p:spPr>
+          <a:xfrm>
+            <a:off x="11371740" y="365125"/>
+            <a:ext cx="599846" cy="535577"/>
+          </a:xfrm>
+          <a:prstGeom prst="rect">
+            <a:avLst/>
+          </a:prstGeom>
+        </p:spPr>
+      </p:pic>
+      <p:sp>
+        <p:nvSpPr>
+          <p:cNvPr id="3" name="Retângulo 2">
+            <a:extLst>
+              <a:ext uri="{FF2B5EF4-FFF2-40B4-BE49-F238E27FC236}">
+                <a16:creationId xmlns:a16="http://schemas.microsoft.com/office/drawing/2014/main" id="{38434F47-BC05-4537-B73A-BFE9B7D40F80}"/>
+              </a:ext>
+            </a:extLst>
+          </p:cNvPr>
+          <p:cNvSpPr/>
+          <p:nvPr/>
+        </p:nvSpPr>
+        <p:spPr>
+          <a:xfrm>
+            <a:off x="629524" y="340525"/>
+            <a:ext cx="2391972" cy="584775"/>
+          </a:xfrm>
+          <a:prstGeom prst="rect">
+            <a:avLst/>
+          </a:prstGeom>
+        </p:spPr>
+        <p:txBody>
+          <a:bodyPr wrap="square">
+            <a:spAutoFit/>
+          </a:bodyPr>
+          <a:lstStyle/>
+          <a:p>
+            <a:pPr algn="ctr"/>
+            <a:r>
+              <a:rPr lang="pt-BR" sz="3200" dirty="0">
+                <a:solidFill>
+                  <a:schemeClr val="tx1">
+                    <a:lumMod val="75000"/>
+                    <a:lumOff val="25000"/>
+                  </a:schemeClr>
+                </a:solidFill>
+                <a:latin typeface="Bariol Bold" panose="02000506040000020003" pitchFamily="2" charset="0"/>
+              </a:rPr>
+              <a:t>Modelo DER</a:t>
+            </a:r>
+          </a:p>
+        </p:txBody>
+      </p:sp>
+    </p:spTree>
+    <p:extLst>
+      <p:ext uri="{BB962C8B-B14F-4D97-AF65-F5344CB8AC3E}">
+        <p14:creationId xmlns:p14="http://schemas.microsoft.com/office/powerpoint/2010/main" val="654880639"/>
       </p:ext>
     </p:extLst>
   </p:cSld>

</xml_diff>